<commit_message>
Mini-Bugfix - Folie 19 Fußezeile Signed-off-by: MAG <mxthammel@gmail.com>
</commit_message>
<xml_diff>
--- a/Dokumente/Zwischenstand zum 2012-04-21_v2.pptx
+++ b/Dokumente/Zwischenstand zum 2012-04-21_v2.pptx
@@ -13758,7 +13758,18 @@
           <p:nvPr/>
         </p:nvPicPr>
         <p:blipFill>
-          <a:blip r:embed="rId2" cstate="print"/>
+          <a:blip r:embed="rId2" cstate="print">
+            <a:clrChange>
+              <a:clrFrom>
+                <a:srgbClr val="FFFFF0"/>
+              </a:clrFrom>
+              <a:clrTo>
+                <a:srgbClr val="FFFFF0">
+                  <a:alpha val="0"/>
+                </a:srgbClr>
+              </a:clrTo>
+            </a:clrChange>
+          </a:blip>
           <a:srcRect/>
           <a:stretch>
             <a:fillRect/>

</xml_diff>